<commit_message>
Information related to the current model added. Plan to organize/participate in a PlugFest.
</commit_message>
<xml_diff>
--- a/iotschema-14122017.pptx
+++ b/iotschema-14122017.pptx
@@ -246,7 +246,8 @@
           <a:p>
             <a:fld id="{32D6123D-5960-234A-AC3B-54483598DB36}" type="datetimeFigureOut">
               <a:rPr lang="en-US" smtClean="0"/>
-              <a:t>12/13/17</a:t>
+              <a:pPr/>
+              <a:t>12/14/2017</a:t>
             </a:fld>
             <a:endParaRPr lang="en-US"/>
           </a:p>
@@ -288,7 +289,8 @@
           <a:p>
             <a:fld id="{7395FFB9-DFE9-0A45-AE22-A47902257D9B}" type="slidenum">
               <a:rPr lang="en-US" smtClean="0"/>
-              <a:t>‹#›</a:t>
+              <a:pPr/>
+              <a:t>‹Nr.›</a:t>
             </a:fld>
             <a:endParaRPr lang="en-US"/>
           </a:p>
@@ -411,7 +413,8 @@
           <a:p>
             <a:fld id="{32D6123D-5960-234A-AC3B-54483598DB36}" type="datetimeFigureOut">
               <a:rPr lang="en-US" smtClean="0"/>
-              <a:t>12/13/17</a:t>
+              <a:pPr/>
+              <a:t>12/14/2017</a:t>
             </a:fld>
             <a:endParaRPr lang="en-US"/>
           </a:p>
@@ -453,7 +456,8 @@
           <a:p>
             <a:fld id="{7395FFB9-DFE9-0A45-AE22-A47902257D9B}" type="slidenum">
               <a:rPr lang="en-US" smtClean="0"/>
-              <a:t>‹#›</a:t>
+              <a:pPr/>
+              <a:t>‹Nr.›</a:t>
             </a:fld>
             <a:endParaRPr lang="en-US"/>
           </a:p>
@@ -586,7 +590,8 @@
           <a:p>
             <a:fld id="{32D6123D-5960-234A-AC3B-54483598DB36}" type="datetimeFigureOut">
               <a:rPr lang="en-US" smtClean="0"/>
-              <a:t>12/13/17</a:t>
+              <a:pPr/>
+              <a:t>12/14/2017</a:t>
             </a:fld>
             <a:endParaRPr lang="en-US"/>
           </a:p>
@@ -628,7 +633,8 @@
           <a:p>
             <a:fld id="{7395FFB9-DFE9-0A45-AE22-A47902257D9B}" type="slidenum">
               <a:rPr lang="en-US" smtClean="0"/>
-              <a:t>‹#›</a:t>
+              <a:pPr/>
+              <a:t>‹Nr.›</a:t>
             </a:fld>
             <a:endParaRPr lang="en-US"/>
           </a:p>
@@ -751,7 +757,8 @@
           <a:p>
             <a:fld id="{32D6123D-5960-234A-AC3B-54483598DB36}" type="datetimeFigureOut">
               <a:rPr lang="en-US" smtClean="0"/>
-              <a:t>12/13/17</a:t>
+              <a:pPr/>
+              <a:t>12/14/2017</a:t>
             </a:fld>
             <a:endParaRPr lang="en-US"/>
           </a:p>
@@ -793,7 +800,8 @@
           <a:p>
             <a:fld id="{7395FFB9-DFE9-0A45-AE22-A47902257D9B}" type="slidenum">
               <a:rPr lang="en-US" smtClean="0"/>
-              <a:t>‹#›</a:t>
+              <a:pPr/>
+              <a:t>‹Nr.›</a:t>
             </a:fld>
             <a:endParaRPr lang="en-US"/>
           </a:p>
@@ -990,7 +998,8 @@
           <a:p>
             <a:fld id="{32D6123D-5960-234A-AC3B-54483598DB36}" type="datetimeFigureOut">
               <a:rPr lang="en-US" smtClean="0"/>
-              <a:t>12/13/17</a:t>
+              <a:pPr/>
+              <a:t>12/14/2017</a:t>
             </a:fld>
             <a:endParaRPr lang="en-US"/>
           </a:p>
@@ -1032,7 +1041,8 @@
           <a:p>
             <a:fld id="{7395FFB9-DFE9-0A45-AE22-A47902257D9B}" type="slidenum">
               <a:rPr lang="en-US" smtClean="0"/>
-              <a:t>‹#›</a:t>
+              <a:pPr/>
+              <a:t>‹Nr.›</a:t>
             </a:fld>
             <a:endParaRPr lang="en-US"/>
           </a:p>
@@ -1217,7 +1227,8 @@
           <a:p>
             <a:fld id="{32D6123D-5960-234A-AC3B-54483598DB36}" type="datetimeFigureOut">
               <a:rPr lang="en-US" smtClean="0"/>
-              <a:t>12/13/17</a:t>
+              <a:pPr/>
+              <a:t>12/14/2017</a:t>
             </a:fld>
             <a:endParaRPr lang="en-US"/>
           </a:p>
@@ -1259,7 +1270,8 @@
           <a:p>
             <a:fld id="{7395FFB9-DFE9-0A45-AE22-A47902257D9B}" type="slidenum">
               <a:rPr lang="en-US" smtClean="0"/>
-              <a:t>‹#›</a:t>
+              <a:pPr/>
+              <a:t>‹Nr.›</a:t>
             </a:fld>
             <a:endParaRPr lang="en-US"/>
           </a:p>
@@ -1579,7 +1591,8 @@
           <a:p>
             <a:fld id="{32D6123D-5960-234A-AC3B-54483598DB36}" type="datetimeFigureOut">
               <a:rPr lang="en-US" smtClean="0"/>
-              <a:t>12/13/17</a:t>
+              <a:pPr/>
+              <a:t>12/14/2017</a:t>
             </a:fld>
             <a:endParaRPr lang="en-US"/>
           </a:p>
@@ -1621,7 +1634,8 @@
           <a:p>
             <a:fld id="{7395FFB9-DFE9-0A45-AE22-A47902257D9B}" type="slidenum">
               <a:rPr lang="en-US" smtClean="0"/>
-              <a:t>‹#›</a:t>
+              <a:pPr/>
+              <a:t>‹Nr.›</a:t>
             </a:fld>
             <a:endParaRPr lang="en-US"/>
           </a:p>
@@ -1692,7 +1706,8 @@
           <a:p>
             <a:fld id="{32D6123D-5960-234A-AC3B-54483598DB36}" type="datetimeFigureOut">
               <a:rPr lang="en-US" smtClean="0"/>
-              <a:t>12/13/17</a:t>
+              <a:pPr/>
+              <a:t>12/14/2017</a:t>
             </a:fld>
             <a:endParaRPr lang="en-US"/>
           </a:p>
@@ -1734,7 +1749,8 @@
           <a:p>
             <a:fld id="{7395FFB9-DFE9-0A45-AE22-A47902257D9B}" type="slidenum">
               <a:rPr lang="en-US" smtClean="0"/>
-              <a:t>‹#›</a:t>
+              <a:pPr/>
+              <a:t>‹Nr.›</a:t>
             </a:fld>
             <a:endParaRPr lang="en-US"/>
           </a:p>
@@ -1782,7 +1798,8 @@
           <a:p>
             <a:fld id="{32D6123D-5960-234A-AC3B-54483598DB36}" type="datetimeFigureOut">
               <a:rPr lang="en-US" smtClean="0"/>
-              <a:t>12/13/17</a:t>
+              <a:pPr/>
+              <a:t>12/14/2017</a:t>
             </a:fld>
             <a:endParaRPr lang="en-US"/>
           </a:p>
@@ -1824,7 +1841,8 @@
           <a:p>
             <a:fld id="{7395FFB9-DFE9-0A45-AE22-A47902257D9B}" type="slidenum">
               <a:rPr lang="en-US" smtClean="0"/>
-              <a:t>‹#›</a:t>
+              <a:pPr/>
+              <a:t>‹Nr.›</a:t>
             </a:fld>
             <a:endParaRPr lang="en-US"/>
           </a:p>
@@ -2054,7 +2072,8 @@
           <a:p>
             <a:fld id="{32D6123D-5960-234A-AC3B-54483598DB36}" type="datetimeFigureOut">
               <a:rPr lang="en-US" smtClean="0"/>
-              <a:t>12/13/17</a:t>
+              <a:pPr/>
+              <a:t>12/14/2017</a:t>
             </a:fld>
             <a:endParaRPr lang="en-US"/>
           </a:p>
@@ -2096,7 +2115,8 @@
           <a:p>
             <a:fld id="{7395FFB9-DFE9-0A45-AE22-A47902257D9B}" type="slidenum">
               <a:rPr lang="en-US" smtClean="0"/>
-              <a:t>‹#›</a:t>
+              <a:pPr/>
+              <a:t>‹Nr.›</a:t>
             </a:fld>
             <a:endParaRPr lang="en-US"/>
           </a:p>
@@ -2306,7 +2326,8 @@
           <a:p>
             <a:fld id="{32D6123D-5960-234A-AC3B-54483598DB36}" type="datetimeFigureOut">
               <a:rPr lang="en-US" smtClean="0"/>
-              <a:t>12/13/17</a:t>
+              <a:pPr/>
+              <a:t>12/14/2017</a:t>
             </a:fld>
             <a:endParaRPr lang="en-US"/>
           </a:p>
@@ -2348,7 +2369,8 @@
           <a:p>
             <a:fld id="{7395FFB9-DFE9-0A45-AE22-A47902257D9B}" type="slidenum">
               <a:rPr lang="en-US" smtClean="0"/>
-              <a:t>‹#›</a:t>
+              <a:pPr/>
+              <a:t>‹Nr.›</a:t>
             </a:fld>
             <a:endParaRPr lang="en-US"/>
           </a:p>
@@ -2514,7 +2536,8 @@
           <a:p>
             <a:fld id="{32D6123D-5960-234A-AC3B-54483598DB36}" type="datetimeFigureOut">
               <a:rPr lang="en-US" smtClean="0"/>
-              <a:t>12/13/17</a:t>
+              <a:pPr/>
+              <a:t>12/14/2017</a:t>
             </a:fld>
             <a:endParaRPr lang="en-US"/>
           </a:p>
@@ -2592,7 +2615,8 @@
           <a:p>
             <a:fld id="{7395FFB9-DFE9-0A45-AE22-A47902257D9B}" type="slidenum">
               <a:rPr lang="en-US" smtClean="0"/>
-              <a:t>‹#›</a:t>
+              <a:pPr/>
+              <a:t>‹Nr.›</a:t>
             </a:fld>
             <a:endParaRPr lang="en-US"/>
           </a:p>
@@ -2601,7 +2625,7 @@
     </p:spTree>
     <p:extLst>
       <p:ext uri="{BB962C8B-B14F-4D97-AF65-F5344CB8AC3E}">
-        <p14:creationId xmlns:p14="http://schemas.microsoft.com/office/powerpoint/2010/main" val="803274192"/>
+        <p14:creationId xmlns:p14="http://schemas.microsoft.com/office/powerpoint/2010/main" xmlns="" val="803274192"/>
       </p:ext>
     </p:extLst>
   </p:cSld>
@@ -2979,7 +3003,7 @@
     </p:spTree>
     <p:extLst>
       <p:ext uri="{BB962C8B-B14F-4D97-AF65-F5344CB8AC3E}">
-        <p14:creationId xmlns:p14="http://schemas.microsoft.com/office/powerpoint/2010/main" val="1046510046"/>
+        <p14:creationId xmlns:p14="http://schemas.microsoft.com/office/powerpoint/2010/main" xmlns="" val="1046510046"/>
       </p:ext>
     </p:extLst>
   </p:cSld>
@@ -3083,7 +3107,7 @@
     </p:spTree>
     <p:extLst>
       <p:ext uri="{BB962C8B-B14F-4D97-AF65-F5344CB8AC3E}">
-        <p14:creationId xmlns:p14="http://schemas.microsoft.com/office/powerpoint/2010/main" val="196773234"/>
+        <p14:creationId xmlns:p14="http://schemas.microsoft.com/office/powerpoint/2010/main" xmlns="" val="196773234"/>
       </p:ext>
     </p:extLst>
   </p:cSld>
@@ -3154,7 +3178,9 @@
           </a:xfrm>
         </p:spPr>
         <p:txBody>
-          <a:bodyPr/>
+          <a:bodyPr>
+            <a:normAutofit lnSpcReduction="10000"/>
+          </a:bodyPr>
           <a:lstStyle/>
           <a:p>
             <a:r>
@@ -3296,7 +3322,7 @@
     </p:spTree>
     <p:extLst>
       <p:ext uri="{BB962C8B-B14F-4D97-AF65-F5344CB8AC3E}">
-        <p14:creationId xmlns:p14="http://schemas.microsoft.com/office/powerpoint/2010/main" val="2070368324"/>
+        <p14:creationId xmlns:p14="http://schemas.microsoft.com/office/powerpoint/2010/main" xmlns="" val="2070368324"/>
       </p:ext>
     </p:extLst>
   </p:cSld>
@@ -3368,7 +3394,9 @@
           </a:xfrm>
         </p:spPr>
         <p:txBody>
-          <a:bodyPr/>
+          <a:bodyPr>
+            <a:normAutofit fontScale="92500" lnSpcReduction="10000"/>
+          </a:bodyPr>
           <a:lstStyle/>
           <a:p>
             <a:r>
@@ -3440,7 +3468,33 @@
           <a:p>
             <a:r>
               <a:rPr lang="en-US" dirty="0" smtClean="0"/>
-              <a:t>Examples of definitions</a:t>
+              <a:t>Design </a:t>
+            </a:r>
+            <a:r>
+              <a:rPr lang="en-US" dirty="0" smtClean="0"/>
+              <a:t>Model </a:t>
+            </a:r>
+            <a:r>
+              <a:rPr lang="en-US" dirty="0" smtClean="0"/>
+              <a:t>Review</a:t>
+            </a:r>
+          </a:p>
+          <a:p>
+            <a:pPr lvl="1"/>
+            <a:r>
+              <a:rPr lang="en-US" dirty="0" smtClean="0"/>
+              <a:t>In prototype website a Capability currently does not show its Interaction Types</a:t>
+            </a:r>
+            <a:endParaRPr lang="en-US" dirty="0" smtClean="0"/>
+          </a:p>
+          <a:p>
+            <a:r>
+              <a:rPr lang="en-US" dirty="0" smtClean="0"/>
+              <a:t>Examples </a:t>
+            </a:r>
+            <a:r>
+              <a:rPr lang="en-US" dirty="0" smtClean="0"/>
+              <a:t>of definitions</a:t>
             </a:r>
           </a:p>
           <a:p>
@@ -3460,14 +3514,14 @@
               <a:rPr lang="en-US" dirty="0" err="1" smtClean="0"/>
               <a:t>colorcontrol</a:t>
             </a:r>
-            <a:endParaRPr lang="en-US" dirty="0"/>
+            <a:endParaRPr lang="en-US" dirty="0" smtClean="0"/>
           </a:p>
         </p:txBody>
       </p:sp>
     </p:spTree>
     <p:extLst>
       <p:ext uri="{BB962C8B-B14F-4D97-AF65-F5344CB8AC3E}">
-        <p14:creationId xmlns:p14="http://schemas.microsoft.com/office/powerpoint/2010/main" val="1753728004"/>
+        <p14:creationId xmlns:p14="http://schemas.microsoft.com/office/powerpoint/2010/main" xmlns="" val="1753728004"/>
       </p:ext>
     </p:extLst>
   </p:cSld>
@@ -4238,23 +4292,7 @@
                   <a:srgbClr val="FF0000"/>
                 </a:solidFill>
               </a:rPr>
-              <a:t>"</a:t>
-            </a:r>
-            <a:r>
-              <a:rPr lang="en-US" dirty="0" smtClean="0">
-                <a:solidFill>
-                  <a:srgbClr val="FF0000"/>
-                </a:solidFill>
-              </a:rPr>
-              <a:t>What </a:t>
-            </a:r>
-            <a:r>
-              <a:rPr lang="en-US" dirty="0" smtClean="0">
-                <a:solidFill>
-                  <a:srgbClr val="FF0000"/>
-                </a:solidFill>
-              </a:rPr>
-              <a:t>to do"</a:t>
+              <a:t>"What to do"</a:t>
             </a:r>
             <a:endParaRPr lang="en-US" dirty="0">
               <a:solidFill>
@@ -4305,7 +4343,7 @@
     </p:spTree>
     <p:extLst>
       <p:ext uri="{BB962C8B-B14F-4D97-AF65-F5344CB8AC3E}">
-        <p14:creationId xmlns:p14="http://schemas.microsoft.com/office/powerpoint/2010/main" val="1669327358"/>
+        <p14:creationId xmlns:p14="http://schemas.microsoft.com/office/powerpoint/2010/main" xmlns="" val="1669327358"/>
       </p:ext>
     </p:extLst>
   </p:cSld>
@@ -5826,7 +5864,7 @@
     </p:spTree>
     <p:extLst>
       <p:ext uri="{BB962C8B-B14F-4D97-AF65-F5344CB8AC3E}">
-        <p14:creationId xmlns:p14="http://schemas.microsoft.com/office/powerpoint/2010/main" val="769218826"/>
+        <p14:creationId xmlns:p14="http://schemas.microsoft.com/office/powerpoint/2010/main" xmlns="" val="769218826"/>
       </p:ext>
     </p:extLst>
   </p:cSld>
@@ -6678,7 +6716,7 @@
     </p:spTree>
     <p:extLst>
       <p:ext uri="{BB962C8B-B14F-4D97-AF65-F5344CB8AC3E}">
-        <p14:creationId xmlns:p14="http://schemas.microsoft.com/office/powerpoint/2010/main" val="1390693553"/>
+        <p14:creationId xmlns:p14="http://schemas.microsoft.com/office/powerpoint/2010/main" xmlns="" val="1390693553"/>
       </p:ext>
     </p:extLst>
   </p:cSld>
@@ -6812,7 +6850,7 @@
     </p:spTree>
     <p:extLst>
       <p:ext uri="{BB962C8B-B14F-4D97-AF65-F5344CB8AC3E}">
-        <p14:creationId xmlns:p14="http://schemas.microsoft.com/office/powerpoint/2010/main" val="47872141"/>
+        <p14:creationId xmlns:p14="http://schemas.microsoft.com/office/powerpoint/2010/main" xmlns="" val="47872141"/>
       </p:ext>
     </p:extLst>
   </p:cSld>
@@ -6884,7 +6922,9 @@
           </a:xfrm>
         </p:spPr>
         <p:txBody>
-          <a:bodyPr/>
+          <a:bodyPr>
+            <a:normAutofit lnSpcReduction="10000"/>
+          </a:bodyPr>
           <a:lstStyle/>
           <a:p>
             <a:r>
@@ -6910,8 +6950,24 @@
             <a:pPr lvl="1"/>
             <a:r>
               <a:rPr lang="en-US" dirty="0" smtClean="0"/>
-              <a:t>Governance process for publication</a:t>
-            </a:r>
+              <a:t>Governance process for </a:t>
+            </a:r>
+            <a:r>
+              <a:rPr lang="en-US" dirty="0" smtClean="0"/>
+              <a:t>publication</a:t>
+            </a:r>
+          </a:p>
+          <a:p>
+            <a:pPr lvl="1"/>
+            <a:r>
+              <a:rPr lang="en-US" dirty="0" smtClean="0"/>
+              <a:t>Preparation of a </a:t>
+            </a:r>
+            <a:r>
+              <a:rPr lang="en-US" dirty="0" err="1" smtClean="0"/>
+              <a:t>PlugFest</a:t>
+            </a:r>
+            <a:endParaRPr lang="en-US" dirty="0" smtClean="0"/>
           </a:p>
           <a:p>
             <a:r>
@@ -6986,7 +7042,7 @@
     </p:spTree>
     <p:extLst>
       <p:ext uri="{BB962C8B-B14F-4D97-AF65-F5344CB8AC3E}">
-        <p14:creationId xmlns:p14="http://schemas.microsoft.com/office/powerpoint/2010/main" val="2046733787"/>
+        <p14:creationId xmlns:p14="http://schemas.microsoft.com/office/powerpoint/2010/main" xmlns="" val="2046733787"/>
       </p:ext>
     </p:extLst>
   </p:cSld>
@@ -7039,7 +7095,7 @@
     </a:clrScheme>
     <a:fontScheme name="Office Theme">
       <a:majorFont>
-        <a:latin typeface="Calibri Light" panose="020F0302020204030204"/>
+        <a:latin typeface="Calibri Light"/>
         <a:ea typeface=""/>
         <a:cs typeface=""/>
         <a:font script="Jpan" typeface="游ゴシック Light"/>
@@ -7074,7 +7130,7 @@
         <a:font script="Geor" typeface="Sylfaen"/>
       </a:majorFont>
       <a:minorFont>
-        <a:latin typeface="Calibri" panose="020F0502020204030204"/>
+        <a:latin typeface="Calibri"/>
         <a:ea typeface=""/>
         <a:cs typeface=""/>
         <a:font script="Jpan" typeface="游ゴシック"/>
@@ -7251,7 +7307,7 @@
   <a:extraClrSchemeLst/>
   <a:extLst>
     <a:ext uri="{05A4C25C-085E-4340-85A3-A5531E510DB2}">
-      <thm15:themeFamily xmlns:thm15="http://schemas.microsoft.com/office/thememl/2012/main" name="Office Theme" id="{62F939B6-93AF-4DB8-9C6B-D6C7DFDC589F}" vid="{4A3C46E8-61CC-4603-A589-7422A47A8E4A}"/>
+      <thm15:themeFamily xmlns:thm15="http://schemas.microsoft.com/office/thememl/2012/main" xmlns="" name="Office Theme" id="{62F939B6-93AF-4DB8-9C6B-D6C7DFDC589F}" vid="{4A3C46E8-61CC-4603-A589-7422A47A8E4A}"/>
     </a:ext>
   </a:extLst>
 </a:theme>

</xml_diff>